<commit_message>
Klammern um Neuronale NEtzwerke in der Classifikatorliste entfernt
jo
</commit_message>
<xml_diff>
--- a/Projektgruppenpräsention.pptx
+++ b/Projektgruppenpräsention.pptx
@@ -268,7 +268,7 @@
           <a:p>
             <a:fld id="{9970A952-D182-47D0-BB0B-66E803D379DF}" type="datetimeFigureOut">
               <a:rPr lang="de-DE" smtClean="0"/>
-              <a:t>29.01.20</a:t>
+              <a:t>29.01.2020</a:t>
             </a:fld>
             <a:endParaRPr lang="de-DE"/>
           </a:p>
@@ -682,7 +682,7 @@
           <a:p>
             <a:fld id="{83AF5F3A-173E-41A1-88E4-D9283F7CF961}" type="datetime1">
               <a:rPr lang="de-DE" smtClean="0"/>
-              <a:t>29.01.20</a:t>
+              <a:t>29.01.2020</a:t>
             </a:fld>
             <a:endParaRPr lang="de-DE"/>
           </a:p>
@@ -880,7 +880,7 @@
           <a:p>
             <a:fld id="{67136FAB-3524-46F8-90EF-15FD34B1A103}" type="datetime1">
               <a:rPr lang="de-DE" smtClean="0"/>
-              <a:t>29.01.20</a:t>
+              <a:t>29.01.2020</a:t>
             </a:fld>
             <a:endParaRPr lang="de-DE"/>
           </a:p>
@@ -1088,7 +1088,7 @@
           <a:p>
             <a:fld id="{4D0EDC95-51A4-4EBF-8097-2751D169EA21}" type="datetime1">
               <a:rPr lang="de-DE" smtClean="0"/>
-              <a:t>29.01.20</a:t>
+              <a:t>29.01.2020</a:t>
             </a:fld>
             <a:endParaRPr lang="de-DE"/>
           </a:p>
@@ -1286,7 +1286,7 @@
           <a:p>
             <a:fld id="{243046D3-AE70-4445-9A51-18A4544EB06C}" type="datetime1">
               <a:rPr lang="de-DE" smtClean="0"/>
-              <a:t>29.01.20</a:t>
+              <a:t>29.01.2020</a:t>
             </a:fld>
             <a:endParaRPr lang="de-DE"/>
           </a:p>
@@ -1561,7 +1561,7 @@
           <a:p>
             <a:fld id="{31BFE2A4-EEDC-498F-9D43-72C906198079}" type="datetime1">
               <a:rPr lang="de-DE" smtClean="0"/>
-              <a:t>29.01.20</a:t>
+              <a:t>29.01.2020</a:t>
             </a:fld>
             <a:endParaRPr lang="de-DE"/>
           </a:p>
@@ -1826,7 +1826,7 @@
           <a:p>
             <a:fld id="{2C39E429-31BA-464B-AABA-32BF99730EE4}" type="datetime1">
               <a:rPr lang="de-DE" smtClean="0"/>
-              <a:t>29.01.20</a:t>
+              <a:t>29.01.2020</a:t>
             </a:fld>
             <a:endParaRPr lang="de-DE"/>
           </a:p>
@@ -2238,7 +2238,7 @@
           <a:p>
             <a:fld id="{42717186-E222-499D-884B-B2FBD6E3BDFA}" type="datetime1">
               <a:rPr lang="de-DE" smtClean="0"/>
-              <a:t>29.01.20</a:t>
+              <a:t>29.01.2020</a:t>
             </a:fld>
             <a:endParaRPr lang="de-DE"/>
           </a:p>
@@ -2379,7 +2379,7 @@
           <a:p>
             <a:fld id="{3CC83454-F47A-4696-A976-75ECB430CB87}" type="datetime1">
               <a:rPr lang="de-DE" smtClean="0"/>
-              <a:t>29.01.20</a:t>
+              <a:t>29.01.2020</a:t>
             </a:fld>
             <a:endParaRPr lang="de-DE"/>
           </a:p>
@@ -2492,7 +2492,7 @@
           <a:p>
             <a:fld id="{19533CB7-914E-416A-8972-D5E7F4407A62}" type="datetime1">
               <a:rPr lang="de-DE" smtClean="0"/>
-              <a:t>29.01.20</a:t>
+              <a:t>29.01.2020</a:t>
             </a:fld>
             <a:endParaRPr lang="de-DE"/>
           </a:p>
@@ -2803,7 +2803,7 @@
           <a:p>
             <a:fld id="{BEA7EBBF-56F2-4788-AB42-14CC33E031AC}" type="datetime1">
               <a:rPr lang="de-DE" smtClean="0"/>
-              <a:t>29.01.20</a:t>
+              <a:t>29.01.2020</a:t>
             </a:fld>
             <a:endParaRPr lang="de-DE"/>
           </a:p>
@@ -3091,7 +3091,7 @@
           <a:p>
             <a:fld id="{6990326C-0FF1-4B7F-B3C4-D2EA2B3EE3DE}" type="datetime1">
               <a:rPr lang="de-DE" smtClean="0"/>
-              <a:t>29.01.20</a:t>
+              <a:t>29.01.2020</a:t>
             </a:fld>
             <a:endParaRPr lang="de-DE"/>
           </a:p>
@@ -3332,7 +3332,7 @@
           <a:p>
             <a:fld id="{024C4B1E-96E9-4E99-A2B7-F535D5C9B736}" type="datetime1">
               <a:rPr lang="de-DE" smtClean="0"/>
-              <a:t>29.01.20</a:t>
+              <a:t>29.01.2020</a:t>
             </a:fld>
             <a:endParaRPr lang="de-DE"/>
           </a:p>
@@ -5176,8 +5176,12 @@
           </a:p>
           <a:p>
             <a:r>
+              <a:rPr lang="de-DE"/>
+              <a:t>Neuronale </a:t>
+            </a:r>
+            <a:r>
               <a:rPr lang="de-DE" dirty="0"/>
-              <a:t>(Neuronale Netzwerke)</a:t>
+              <a:t>Netzwerke</a:t>
             </a:r>
           </a:p>
         </p:txBody>

</xml_diff>